<commit_message>
the last yalla yalla i swear
</commit_message>
<xml_diff>
--- a/Midterm part 2/3_3-1 bis - Developing REST WS with Apache CXF-Maven and Asynch.pptx
+++ b/Midterm part 2/3_3-1 bis - Developing REST WS with Apache CXF-Maven and Asynch.pptx
@@ -10049,6 +10049,42 @@
           <a:chExt cx="0" cy="0"/>
         </a:xfrm>
       </p:grpSpPr>
+      <p:sp>
+        <p:nvSpPr>
+          <p:cNvPr id="2" name="Titolo 1"/>
+          <p:cNvSpPr>
+            <a:spLocks noGrp="1"/>
+          </p:cNvSpPr>
+          <p:nvPr>
+            <p:ph type="title"/>
+          </p:nvPr>
+        </p:nvSpPr>
+        <p:spPr/>
+        <p:txBody>
+          <a:bodyPr>
+            <a:normAutofit/>
+          </a:bodyPr>
+          <a:lstStyle/>
+          <a:p>
+            <a:r>
+              <a:rPr lang="it-IT" sz="2800" err="1">
+                <a:solidFill>
+                  <a:schemeClr val="tx1"/>
+                </a:solidFill>
+              </a:rPr>
+              <a:t>Deploy</a:t>
+            </a:r>
+            <a:r>
+              <a:rPr lang="it-IT" sz="2800">
+                <a:solidFill>
+                  <a:schemeClr val="tx1"/>
+                </a:solidFill>
+              </a:rPr>
+              <a:t> the Service</a:t>
+            </a:r>
+          </a:p>
+        </p:txBody>
+      </p:sp>
       <p:pic>
         <p:nvPicPr>
           <p:cNvPr id="14" name="Immagine 13">
@@ -10079,42 +10115,36 @@
           </a:prstGeom>
         </p:spPr>
       </p:pic>
-      <p:sp>
-        <p:nvSpPr>
-          <p:cNvPr id="2" name="Titolo 1"/>
-          <p:cNvSpPr>
-            <a:spLocks noGrp="1"/>
-          </p:cNvSpPr>
-          <p:nvPr>
-            <p:ph type="title"/>
-          </p:nvPr>
-        </p:nvSpPr>
-        <p:spPr/>
-        <p:txBody>
-          <a:bodyPr>
-            <a:normAutofit/>
-          </a:bodyPr>
-          <a:lstStyle/>
-          <a:p>
-            <a:r>
-              <a:rPr lang="it-IT" sz="2800" err="1">
-                <a:solidFill>
-                  <a:schemeClr val="tx1"/>
-                </a:solidFill>
-              </a:rPr>
-              <a:t>Deploy</a:t>
-            </a:r>
-            <a:r>
-              <a:rPr lang="it-IT" sz="2800">
-                <a:solidFill>
-                  <a:schemeClr val="tx1"/>
-                </a:solidFill>
-              </a:rPr>
-              <a:t> the Service</a:t>
-            </a:r>
-          </a:p>
-        </p:txBody>
-      </p:sp>
+      <p:pic>
+        <p:nvPicPr>
+          <p:cNvPr id="16" name="Immagine 15">
+            <a:extLst>
+              <a:ext uri="{FF2B5EF4-FFF2-40B4-BE49-F238E27FC236}">
+                <a16:creationId xmlns:a16="http://schemas.microsoft.com/office/drawing/2014/main" id="{214D7684-5222-E4B0-2ECD-8CD0FBC15A81}"/>
+              </a:ext>
+            </a:extLst>
+          </p:cNvPr>
+          <p:cNvPicPr>
+            <a:picLocks noChangeAspect="1"/>
+          </p:cNvPicPr>
+          <p:nvPr/>
+        </p:nvPicPr>
+        <p:blipFill>
+          <a:blip r:embed="rId4"/>
+          <a:stretch>
+            <a:fillRect/>
+          </a:stretch>
+        </p:blipFill>
+        <p:spPr>
+          <a:xfrm>
+            <a:off x="723890" y="3245080"/>
+            <a:ext cx="7231053" cy="2994921"/>
+          </a:xfrm>
+          <a:prstGeom prst="rect">
+            <a:avLst/>
+          </a:prstGeom>
+        </p:spPr>
+      </p:pic>
       <p:sp>
         <p:nvSpPr>
           <p:cNvPr id="4" name="Segnaposto piè di pagina 3"/>
@@ -10267,50 +10297,6 @@
           </a:p>
         </p:txBody>
       </p:sp>
-      <p:pic>
-        <p:nvPicPr>
-          <p:cNvPr id="13" name="Immagine 12"/>
-          <p:cNvPicPr>
-            <a:picLocks noChangeAspect="1"/>
-          </p:cNvPicPr>
-          <p:nvPr/>
-        </p:nvPicPr>
-        <p:blipFill>
-          <a:blip r:embed="rId4">
-            <a:extLst>
-              <a:ext uri="{BEBA8EAE-BF5A-486C-A8C5-ECC9F3942E4B}">
-                <a14:imgProps xmlns:a14="http://schemas.microsoft.com/office/drawing/2010/main">
-                  <a14:imgLayer r:embed="rId5">
-                    <a14:imgEffect>
-                      <a14:saturation sat="400000"/>
-                    </a14:imgEffect>
-                    <a14:imgEffect>
-                      <a14:brightnessContrast contrast="-40000"/>
-                    </a14:imgEffect>
-                  </a14:imgLayer>
-                </a14:imgProps>
-              </a:ext>
-            </a:extLst>
-          </a:blip>
-          <a:stretch>
-            <a:fillRect/>
-          </a:stretch>
-        </p:blipFill>
-        <p:spPr>
-          <a:xfrm>
-            <a:off x="1037122" y="3453822"/>
-            <a:ext cx="6858000" cy="2476500"/>
-          </a:xfrm>
-          <a:prstGeom prst="rect">
-            <a:avLst/>
-          </a:prstGeom>
-          <a:ln>
-            <a:solidFill>
-              <a:srgbClr val="FF6600"/>
-            </a:solidFill>
-          </a:ln>
-        </p:spPr>
-      </p:pic>
       <p:cxnSp>
         <p:nvCxnSpPr>
           <p:cNvPr id="10" name="Connettore 4 12"/>
@@ -10393,88 +10379,6 @@
           </a:p>
         </p:txBody>
       </p:sp>
-      <p:sp>
-        <p:nvSpPr>
-          <p:cNvPr id="12" name="TextBox 11">
-            <a:extLst>
-              <a:ext uri="{FF2B5EF4-FFF2-40B4-BE49-F238E27FC236}">
-                <a16:creationId xmlns:a16="http://schemas.microsoft.com/office/drawing/2014/main" id="{1D422B6D-E268-B822-5EB3-6C958B1AF15F}"/>
-              </a:ext>
-            </a:extLst>
-          </p:cNvPr>
-          <p:cNvSpPr txBox="1"/>
-          <p:nvPr/>
-        </p:nvSpPr>
-        <p:spPr>
-          <a:xfrm>
-            <a:off x="3554009" y="5043924"/>
-            <a:ext cx="3821012" cy="523220"/>
-          </a:xfrm>
-          <a:prstGeom prst="rect">
-            <a:avLst/>
-          </a:prstGeom>
-          <a:noFill/>
-        </p:spPr>
-        <p:txBody>
-          <a:bodyPr wrap="square">
-            <a:spAutoFit/>
-          </a:bodyPr>
-          <a:lstStyle/>
-          <a:p>
-            <a:pPr algn="l"/>
-            <a:r>
-              <a:rPr lang="en-GB" sz="1400" b="1" i="0" u="none" strike="noStrike" dirty="0">
-                <a:solidFill>
-                  <a:srgbClr val="FF6600"/>
-                </a:solidFill>
-                <a:effectLst/>
-                <a:latin typeface="RALEWAY LIGHT" panose="020B0403030101060003" pitchFamily="34" charset="77"/>
-              </a:rPr>
-              <a:t>204 - No content</a:t>
-            </a:r>
-            <a:r>
-              <a:rPr lang="en-GB" sz="1400" b="0" i="0" u="none" strike="noStrike" dirty="0">
-                <a:solidFill>
-                  <a:srgbClr val="FF6600"/>
-                </a:solidFill>
-                <a:effectLst/>
-                <a:latin typeface="Raleway Light" panose="020B0403030101060003" pitchFamily="34" charset="77"/>
-              </a:rPr>
-              <a:t>: the request was successful but there is no data to transfer</a:t>
-            </a:r>
-          </a:p>
-        </p:txBody>
-      </p:sp>
-      <p:pic>
-        <p:nvPicPr>
-          <p:cNvPr id="16" name="Immagine 15">
-            <a:extLst>
-              <a:ext uri="{FF2B5EF4-FFF2-40B4-BE49-F238E27FC236}">
-                <a16:creationId xmlns:a16="http://schemas.microsoft.com/office/drawing/2014/main" id="{214D7684-5222-E4B0-2ECD-8CD0FBC15A81}"/>
-              </a:ext>
-            </a:extLst>
-          </p:cNvPr>
-          <p:cNvPicPr>
-            <a:picLocks noChangeAspect="1"/>
-          </p:cNvPicPr>
-          <p:nvPr/>
-        </p:nvPicPr>
-        <p:blipFill>
-          <a:blip r:embed="rId6"/>
-          <a:stretch>
-            <a:fillRect/>
-          </a:stretch>
-        </p:blipFill>
-        <p:spPr>
-          <a:xfrm>
-            <a:off x="8753901" y="464504"/>
-            <a:ext cx="8601075" cy="3562350"/>
-          </a:xfrm>
-          <a:prstGeom prst="rect">
-            <a:avLst/>
-          </a:prstGeom>
-        </p:spPr>
-      </p:pic>
     </p:spTree>
     <p:extLst>
       <p:ext uri="{BB962C8B-B14F-4D97-AF65-F5344CB8AC3E}">
@@ -20880,18 +20784,18 @@
 </file>
 
 <file path=customXml/item1.xml><?xml version="1.0" encoding="utf-8"?>
-<p:properties xmlns:p="http://schemas.microsoft.com/office/2006/metadata/properties" xmlns:xsi="http://www.w3.org/2001/XMLSchema-instance" xmlns:pc="http://schemas.microsoft.com/office/infopath/2007/PartnerControls">
-  <documentManagement/>
-</p:properties>
-</file>
-
-<file path=customXml/item2.xml><?xml version="1.0" encoding="utf-8"?>
 <?mso-contentType ?>
 <FormTemplates xmlns="http://schemas.microsoft.com/sharepoint/v3/contenttype/forms">
   <Display>DocumentLibraryForm</Display>
   <Edit>DocumentLibraryForm</Edit>
   <New>DocumentLibraryForm</New>
 </FormTemplates>
+</file>
+
+<file path=customXml/item2.xml><?xml version="1.0" encoding="utf-8"?>
+<p:properties xmlns:p="http://schemas.microsoft.com/office/2006/metadata/properties" xmlns:xsi="http://www.w3.org/2001/XMLSchema-instance" xmlns:pc="http://schemas.microsoft.com/office/infopath/2007/PartnerControls">
+  <documentManagement/>
+</p:properties>
 </file>
 
 <file path=customXml/item3.xml><?xml version="1.0" encoding="utf-8"?>
@@ -21033,18 +20937,18 @@
 </file>
 
 <file path=customXml/itemProps1.xml><?xml version="1.0" encoding="utf-8"?>
-<ds:datastoreItem xmlns:ds="http://schemas.openxmlformats.org/officeDocument/2006/customXml" ds:itemID="{3AB7779E-58E6-4884-8898-B841B14F0622}">
+<ds:datastoreItem xmlns:ds="http://schemas.openxmlformats.org/officeDocument/2006/customXml" ds:itemID="{9A531606-AEC1-44A7-A61C-2996AEE368D1}">
   <ds:schemaRefs>
-    <ds:schemaRef ds:uri="http://schemas.microsoft.com/office/2006/metadata/properties"/>
-    <ds:schemaRef ds:uri="http://schemas.microsoft.com/office/infopath/2007/PartnerControls"/>
+    <ds:schemaRef ds:uri="http://schemas.microsoft.com/sharepoint/v3/contenttype/forms"/>
   </ds:schemaRefs>
 </ds:datastoreItem>
 </file>
 
 <file path=customXml/itemProps2.xml><?xml version="1.0" encoding="utf-8"?>
-<ds:datastoreItem xmlns:ds="http://schemas.openxmlformats.org/officeDocument/2006/customXml" ds:itemID="{9A531606-AEC1-44A7-A61C-2996AEE368D1}">
+<ds:datastoreItem xmlns:ds="http://schemas.openxmlformats.org/officeDocument/2006/customXml" ds:itemID="{3AB7779E-58E6-4884-8898-B841B14F0622}">
   <ds:schemaRefs>
-    <ds:schemaRef ds:uri="http://schemas.microsoft.com/sharepoint/v3/contenttype/forms"/>
+    <ds:schemaRef ds:uri="http://schemas.microsoft.com/office/2006/metadata/properties"/>
+    <ds:schemaRef ds:uri="http://schemas.microsoft.com/office/infopath/2007/PartnerControls"/>
   </ds:schemaRefs>
 </ds:datastoreItem>
 </file>

</xml_diff>